<commit_message>
* Technical report minor modifications * Agents ppt improvement
</commit_message>
<xml_diff>
--- a/Documentation/Agents/agents_first_implementation.pptx
+++ b/Documentation/Agents/agents_first_implementation.pptx
@@ -201,7 +201,7 @@
           </a:lstStyle>
           <a:p>
             <a:fld id="{09DBE090-B920-4747-B282-F4A38E0E9820}" type="datetimeFigureOut">
-              <a:t>2/19/18</a:t>
+              <a:t>15/5/18</a:t>
             </a:fld>
             <a:endParaRPr lang="en-US"/>
           </a:p>
@@ -596,7 +596,7 @@
           <a:p>
             <a:fld id="{0FB34785-9B18-DE47-879C-98860989B339}" type="datetimeFigureOut">
               <a:rPr lang="es-ES"/>
-              <a:t>19/2/18</a:t>
+              <a:t>15/5/18</a:t>
             </a:fld>
             <a:endParaRPr lang="en-US"/>
           </a:p>
@@ -764,7 +764,7 @@
           <a:p>
             <a:fld id="{0FB34785-9B18-DE47-879C-98860989B339}" type="datetimeFigureOut">
               <a:rPr lang="es-ES"/>
-              <a:t>19/2/18</a:t>
+              <a:t>15/5/18</a:t>
             </a:fld>
             <a:endParaRPr lang="en-US"/>
           </a:p>
@@ -942,7 +942,7 @@
           <a:p>
             <a:fld id="{0FB34785-9B18-DE47-879C-98860989B339}" type="datetimeFigureOut">
               <a:rPr lang="es-ES"/>
-              <a:t>19/2/18</a:t>
+              <a:t>15/5/18</a:t>
             </a:fld>
             <a:endParaRPr lang="en-US"/>
           </a:p>
@@ -1110,7 +1110,7 @@
           <a:p>
             <a:fld id="{0FB34785-9B18-DE47-879C-98860989B339}" type="datetimeFigureOut">
               <a:rPr lang="es-ES"/>
-              <a:t>19/2/18</a:t>
+              <a:t>15/5/18</a:t>
             </a:fld>
             <a:endParaRPr lang="en-US"/>
           </a:p>
@@ -1355,7 +1355,7 @@
           <a:p>
             <a:fld id="{0FB34785-9B18-DE47-879C-98860989B339}" type="datetimeFigureOut">
               <a:rPr lang="es-ES"/>
-              <a:t>19/2/18</a:t>
+              <a:t>15/5/18</a:t>
             </a:fld>
             <a:endParaRPr lang="en-US"/>
           </a:p>
@@ -1584,7 +1584,7 @@
           <a:p>
             <a:fld id="{0FB34785-9B18-DE47-879C-98860989B339}" type="datetimeFigureOut">
               <a:rPr lang="es-ES"/>
-              <a:t>19/2/18</a:t>
+              <a:t>15/5/18</a:t>
             </a:fld>
             <a:endParaRPr lang="en-US"/>
           </a:p>
@@ -1948,7 +1948,7 @@
           <a:p>
             <a:fld id="{0FB34785-9B18-DE47-879C-98860989B339}" type="datetimeFigureOut">
               <a:rPr lang="es-ES"/>
-              <a:t>19/2/18</a:t>
+              <a:t>15/5/18</a:t>
             </a:fld>
             <a:endParaRPr lang="en-US"/>
           </a:p>
@@ -2065,7 +2065,7 @@
           <a:p>
             <a:fld id="{0FB34785-9B18-DE47-879C-98860989B339}" type="datetimeFigureOut">
               <a:rPr lang="es-ES"/>
-              <a:t>19/2/18</a:t>
+              <a:t>15/5/18</a:t>
             </a:fld>
             <a:endParaRPr lang="en-US"/>
           </a:p>
@@ -2160,7 +2160,7 @@
           <a:p>
             <a:fld id="{0FB34785-9B18-DE47-879C-98860989B339}" type="datetimeFigureOut">
               <a:rPr lang="es-ES"/>
-              <a:t>19/2/18</a:t>
+              <a:t>15/5/18</a:t>
             </a:fld>
             <a:endParaRPr lang="en-US"/>
           </a:p>
@@ -2435,7 +2435,7 @@
           <a:p>
             <a:fld id="{0FB34785-9B18-DE47-879C-98860989B339}" type="datetimeFigureOut">
               <a:rPr lang="es-ES"/>
-              <a:t>19/2/18</a:t>
+              <a:t>15/5/18</a:t>
             </a:fld>
             <a:endParaRPr lang="en-US"/>
           </a:p>
@@ -2687,7 +2687,7 @@
           <a:p>
             <a:fld id="{0FB34785-9B18-DE47-879C-98860989B339}" type="datetimeFigureOut">
               <a:rPr lang="es-ES"/>
-              <a:t>19/2/18</a:t>
+              <a:t>15/5/18</a:t>
             </a:fld>
             <a:endParaRPr lang="en-US"/>
           </a:p>
@@ -2898,7 +2898,7 @@
           <a:p>
             <a:fld id="{0FB34785-9B18-DE47-879C-98860989B339}" type="datetimeFigureOut">
               <a:rPr lang="es-ES"/>
-              <a:t>19/2/18</a:t>
+              <a:t>15/5/18</a:t>
             </a:fld>
             <a:endParaRPr lang="en-US"/>
           </a:p>
@@ -3505,15 +3505,7 @@
                 <a:ea typeface="Times" charset="0"/>
                 <a:cs typeface="Times" charset="0"/>
               </a:rPr>
-              <a:t>Agents are introduced to modify the configuration of simulated WLANs in order to maximize a certain performance metric</a:t>
-            </a:r>
-            <a:r>
-              <a:rPr lang="en-US">
-                <a:latin typeface="Times" charset="0"/>
-                <a:ea typeface="Times" charset="0"/>
-                <a:cs typeface="Times" charset="0"/>
-              </a:rPr>
-              <a:t> (local or globally)</a:t>
+              <a:t>Agents are introduced to modify the configuration of simulated WLANs in order to maximize a certain performance metric (local or globally)</a:t>
             </a:r>
           </a:p>
           <a:p>
@@ -3559,9 +3551,6 @@
               </a:rPr>
               <a:t>Adaptive delay for such a communication</a:t>
             </a:r>
-          </a:p>
-          <a:p>
-            <a:endParaRPr lang="en-US"/>
           </a:p>
         </p:txBody>
       </p:sp>
@@ -4144,10 +4133,10 @@
           </p:nvGrpSpPr>
           <p:grpSpPr>
             <a:xfrm>
-              <a:off x="325984" y="2164728"/>
-              <a:ext cx="2938645" cy="953423"/>
-              <a:chOff x="8828114" y="3116096"/>
-              <a:chExt cx="2938645" cy="953423"/>
+              <a:off x="325984" y="2114724"/>
+              <a:ext cx="2896631" cy="1045756"/>
+              <a:chOff x="8828114" y="3066092"/>
+              <a:chExt cx="2896631" cy="1045756"/>
             </a:xfrm>
           </p:grpSpPr>
           <p:sp>
@@ -4312,8 +4301,8 @@
             </p:nvSpPr>
             <p:spPr>
               <a:xfrm>
-                <a:off x="9112760" y="3116096"/>
-                <a:ext cx="2653999" cy="369332"/>
+                <a:off x="9070746" y="3066092"/>
+                <a:ext cx="2653999" cy="461665"/>
               </a:xfrm>
               <a:prstGeom prst="rect">
                 <a:avLst/>
@@ -4327,7 +4316,7 @@
               <a:lstStyle/>
               <a:p>
                 <a:r>
-                  <a:rPr lang="en-US">
+                  <a:rPr lang="en-US" sz="2400">
                     <a:solidFill>
                       <a:schemeClr val="accent6">
                         <a:lumMod val="50000"/>
@@ -4350,8 +4339,8 @@
             </p:nvSpPr>
             <p:spPr>
               <a:xfrm>
-                <a:off x="9112759" y="3407815"/>
-                <a:ext cx="2653999" cy="369332"/>
+                <a:off x="9070745" y="3357811"/>
+                <a:ext cx="2653999" cy="461665"/>
               </a:xfrm>
               <a:prstGeom prst="rect">
                 <a:avLst/>
@@ -4365,7 +4354,7 @@
               <a:lstStyle/>
               <a:p>
                 <a:r>
-                  <a:rPr lang="en-US">
+                  <a:rPr lang="en-US" sz="2400">
                     <a:solidFill>
                       <a:srgbClr val="FF0000"/>
                     </a:solidFill>
@@ -4386,8 +4375,8 @@
             </p:nvSpPr>
             <p:spPr>
               <a:xfrm>
-                <a:off x="9112759" y="3700187"/>
-                <a:ext cx="2653999" cy="369332"/>
+                <a:off x="9070745" y="3650183"/>
+                <a:ext cx="2653999" cy="461665"/>
               </a:xfrm>
               <a:prstGeom prst="rect">
                 <a:avLst/>
@@ -4401,7 +4390,7 @@
               <a:lstStyle/>
               <a:p>
                 <a:r>
-                  <a:rPr lang="en-US">
+                  <a:rPr lang="en-US" sz="2400">
                     <a:solidFill>
                       <a:srgbClr val="0070C0"/>
                     </a:solidFill>
@@ -5538,7 +5527,7 @@
                 <a:ea typeface="Times" charset="0"/>
                 <a:cs typeface="Times" charset="0"/>
               </a:rPr>
-              <a:t>By now, all the agents are synchronized if they use the same time between requests</a:t>
+              <a:t>Agents start their operation at a random time</a:t>
             </a:r>
           </a:p>
           <a:p>

</xml_diff>